<commit_message>
updating slides removing .class files
</commit_message>
<xml_diff>
--- a/ClassMaterials/SimpleObjects/Slides/Classes and References.pptx
+++ b/ClassMaterials/SimpleObjects/Slides/Classes and References.pptx
@@ -5,7 +5,7 @@
     <p:sldMasterId id="2147483661" r:id="rId1"/>
   </p:sldMasterIdLst>
   <p:notesMasterIdLst>
-    <p:notesMasterId r:id="rId19"/>
+    <p:notesMasterId r:id="rId21"/>
   </p:notesMasterIdLst>
   <p:sldIdLst>
     <p:sldId id="256" r:id="rId2"/>
@@ -16,7 +16,7 @@
     <p:sldId id="261" r:id="rId7"/>
     <p:sldId id="262" r:id="rId8"/>
     <p:sldId id="263" r:id="rId9"/>
-    <p:sldId id="264" r:id="rId10"/>
+    <p:sldId id="274" r:id="rId10"/>
     <p:sldId id="265" r:id="rId11"/>
     <p:sldId id="266" r:id="rId12"/>
     <p:sldId id="273" r:id="rId13"/>
@@ -24,7 +24,9 @@
     <p:sldId id="269" r:id="rId15"/>
     <p:sldId id="270" r:id="rId16"/>
     <p:sldId id="271" r:id="rId17"/>
-    <p:sldId id="272" r:id="rId18"/>
+    <p:sldId id="275" r:id="rId18"/>
+    <p:sldId id="276" r:id="rId19"/>
+    <p:sldId id="272" r:id="rId20"/>
   </p:sldIdLst>
   <p:sldSz cx="9144000" cy="6858000" type="screen4x3"/>
   <p:notesSz cx="7315200" cy="9601200"/>
@@ -979,6 +981,176 @@
       </p:grpSpPr>
       <p:sp>
         <p:nvSpPr>
+          <p:cNvPr id="2" name="Slide Image Placeholder 1"/>
+          <p:cNvSpPr>
+            <a:spLocks noGrp="1" noRot="1" noChangeAspect="1"/>
+          </p:cNvSpPr>
+          <p:nvPr>
+            <p:ph type="sldImg"/>
+          </p:nvPr>
+        </p:nvSpPr>
+        <p:spPr>
+          <a:xfrm>
+            <a:off x="1497013" y="1200150"/>
+            <a:ext cx="4321175" cy="3240088"/>
+          </a:xfrm>
+          <a:prstGeom prst="rect">
+            <a:avLst/>
+          </a:prstGeom>
+          <a:noFill/>
+          <a:ln w="12700">
+            <a:solidFill>
+              <a:prstClr val="black"/>
+            </a:solidFill>
+          </a:ln>
+        </p:spPr>
+      </p:sp>
+      <p:sp>
+        <p:nvSpPr>
+          <p:cNvPr id="3" name="Notes Placeholder 2"/>
+          <p:cNvSpPr>
+            <a:spLocks noGrp="1"/>
+          </p:cNvSpPr>
+          <p:nvPr>
+            <p:ph type="body" idx="1"/>
+          </p:nvPr>
+        </p:nvSpPr>
+        <p:spPr/>
+        <p:txBody>
+          <a:bodyPr/>
+          <a:lstStyle/>
+          <a:p>
+            <a:r>
+              <a:rPr lang="en-US" dirty="0"/>
+              <a:t>Prompt</a:t>
+            </a:r>
+            <a:r>
+              <a:rPr lang="en-US" baseline="0" dirty="0"/>
+              <a:t> the students, which is static? Which is non-static/instance?</a:t>
+            </a:r>
+          </a:p>
+          <a:p>
+            <a:r>
+              <a:rPr lang="en-US" baseline="0" dirty="0"/>
+              <a:t>Might consider asking the students to role play as point A and point B and point C, ask a random student how far apart A and B are? </a:t>
+            </a:r>
+          </a:p>
+          <a:p>
+            <a:r>
+              <a:rPr lang="en-US" baseline="0" dirty="0"/>
+              <a:t>Then ask A how far away he/she is from B? Then ask C how far away they are from B?</a:t>
+            </a:r>
+          </a:p>
+          <a:p>
+            <a:r>
+              <a:rPr lang="en-US" baseline="0" dirty="0"/>
+              <a:t>It DEPENDS upon who you ask with and instance call, but it does matter who you ask with a static call.</a:t>
+            </a:r>
+          </a:p>
+          <a:p>
+            <a:endParaRPr lang="en-US" baseline="0" dirty="0"/>
+          </a:p>
+          <a:p>
+            <a:r>
+              <a:rPr lang="en-US" baseline="0" dirty="0"/>
+              <a:t>Then live code the </a:t>
+            </a:r>
+            <a:r>
+              <a:rPr lang="en-US" baseline="0" dirty="0" smtClean="0"/>
+              <a:t>class </a:t>
+            </a:r>
+            <a:r>
+              <a:rPr lang="en-US" baseline="0" dirty="0"/>
+              <a:t>methods with them.  </a:t>
+            </a:r>
+            <a:r>
+              <a:rPr lang="en-US" baseline="0" dirty="0" err="1"/>
+              <a:t>distanceFormulaCalc</a:t>
+            </a:r>
+            <a:r>
+              <a:rPr lang="en-US" baseline="0" dirty="0"/>
+              <a:t> is provided to make this as quick as possible.</a:t>
+            </a:r>
+            <a:endParaRPr lang="en-US" dirty="0"/>
+          </a:p>
+        </p:txBody>
+      </p:sp>
+      <p:sp>
+        <p:nvSpPr>
+          <p:cNvPr id="4" name="Slide Number Placeholder 3"/>
+          <p:cNvSpPr>
+            <a:spLocks noGrp="1"/>
+          </p:cNvSpPr>
+          <p:nvPr>
+            <p:ph type="sldNum" idx="10"/>
+          </p:nvPr>
+        </p:nvSpPr>
+        <p:spPr/>
+        <p:txBody>
+          <a:bodyPr/>
+          <a:lstStyle/>
+          <a:p>
+            <a:pPr algn="r"/>
+            <a:fld id="{18E27A71-88A0-42AC-8446-7577892AB166}" type="slidenum">
+              <a:rPr lang="en-US" sz="1400" b="0" strike="noStrike" spc="-1" smtClean="0">
+                <a:solidFill>
+                  <a:srgbClr val="000000"/>
+                </a:solidFill>
+                <a:uFill>
+                  <a:solidFill>
+                    <a:srgbClr val="FFFFFF"/>
+                  </a:solidFill>
+                </a:uFill>
+                <a:latin typeface="Times New Roman"/>
+              </a:rPr>
+              <a:t>17</a:t>
+            </a:fld>
+            <a:endParaRPr lang="en-US" sz="1400" b="0" strike="noStrike" spc="-1">
+              <a:solidFill>
+                <a:srgbClr val="000000"/>
+              </a:solidFill>
+              <a:uFill>
+                <a:solidFill>
+                  <a:srgbClr val="FFFFFF"/>
+                </a:solidFill>
+              </a:uFill>
+              <a:latin typeface="Times New Roman"/>
+            </a:endParaRPr>
+          </a:p>
+        </p:txBody>
+      </p:sp>
+    </p:spTree>
+    <p:extLst>
+      <p:ext uri="{BB962C8B-B14F-4D97-AF65-F5344CB8AC3E}">
+        <p14:creationId xmlns:p14="http://schemas.microsoft.com/office/powerpoint/2010/main" val="3558536368"/>
+      </p:ext>
+    </p:extLst>
+  </p:cSld>
+  <p:clrMapOvr>
+    <a:masterClrMapping/>
+  </p:clrMapOvr>
+</p:notes>
+</file>
+
+<file path=ppt/notesSlides/notesSlide14.xml><?xml version="1.0" encoding="utf-8"?>
+<p:notes xmlns:a="http://schemas.openxmlformats.org/drawingml/2006/main" xmlns:r="http://schemas.openxmlformats.org/officeDocument/2006/relationships" xmlns:p="http://schemas.openxmlformats.org/presentationml/2006/main">
+  <p:cSld>
+    <p:spTree>
+      <p:nvGrpSpPr>
+        <p:cNvPr id="1" name=""/>
+        <p:cNvGrpSpPr/>
+        <p:nvPr/>
+      </p:nvGrpSpPr>
+      <p:grpSpPr>
+        <a:xfrm>
+          <a:off x="0" y="0"/>
+          <a:ext cx="0" cy="0"/>
+          <a:chOff x="0" y="0"/>
+          <a:chExt cx="0" cy="0"/>
+        </a:xfrm>
+      </p:grpSpPr>
+      <p:sp>
+        <p:nvSpPr>
           <p:cNvPr id="248" name="PlaceHolder 1"/>
           <p:cNvSpPr>
             <a:spLocks noGrp="1"/>
@@ -1055,7 +1227,7 @@
                 <a:latin typeface="Calibri"/>
                 <a:ea typeface="+mn-ea"/>
               </a:rPr>
-              <a:t>17</a:t>
+              <a:t>19</a:t>
             </a:fld>
             <a:endParaRPr lang="en-US" sz="1400" b="0" strike="noStrike" spc="-1">
               <a:solidFill>
@@ -2351,7 +2523,7 @@
     </p:spTree>
     <p:extLst>
       <p:ext uri="{BB962C8B-B14F-4D97-AF65-F5344CB8AC3E}">
-        <p14:creationId xmlns:p14="http://schemas.microsoft.com/office/powerpoint/2010/main" val="1274638015"/>
+        <p14:creationId xmlns:p14="http://schemas.microsoft.com/office/powerpoint/2010/main" val="2835313470"/>
       </p:ext>
     </p:extLst>
   </p:cSld>
@@ -3099,7 +3271,7 @@
               <a:pPr>
                 <a:defRPr/>
               </a:pPr>
-              <a:t>Sunday, September 9, 2018</a:t>
+              <a:t>Saturday, February 29, 2020</a:t>
             </a:fld>
             <a:endParaRPr lang="en-US" dirty="0"/>
           </a:p>
@@ -3282,7 +3454,7 @@
               <a:pPr>
                 <a:defRPr/>
               </a:pPr>
-              <a:t>Sunday, September 9, 2018</a:t>
+              <a:t>Saturday, February 29, 2020</a:t>
             </a:fld>
             <a:endParaRPr lang="en-US" dirty="0"/>
           </a:p>
@@ -3542,7 +3714,7 @@
               <a:pPr>
                 <a:defRPr/>
               </a:pPr>
-              <a:t>Sunday, September 9, 2018</a:t>
+              <a:t>Saturday, February 29, 2020</a:t>
             </a:fld>
             <a:endParaRPr lang="en-US"/>
           </a:p>
@@ -11194,6 +11366,254 @@
 </file>
 
 <file path=ppt/slides/slide17.xml><?xml version="1.0" encoding="utf-8"?>
+<p:sld xmlns:a="http://schemas.openxmlformats.org/drawingml/2006/main" xmlns:r="http://schemas.openxmlformats.org/officeDocument/2006/relationships" xmlns:p="http://schemas.openxmlformats.org/presentationml/2006/main">
+  <p:cSld>
+    <p:spTree>
+      <p:nvGrpSpPr>
+        <p:cNvPr id="1" name=""/>
+        <p:cNvGrpSpPr/>
+        <p:nvPr/>
+      </p:nvGrpSpPr>
+      <p:grpSpPr>
+        <a:xfrm>
+          <a:off x="0" y="0"/>
+          <a:ext cx="0" cy="0"/>
+          <a:chOff x="0" y="0"/>
+          <a:chExt cx="0" cy="0"/>
+        </a:xfrm>
+      </p:grpSpPr>
+      <p:sp>
+        <p:nvSpPr>
+          <p:cNvPr id="2" name="Title 1"/>
+          <p:cNvSpPr>
+            <a:spLocks noGrp="1"/>
+          </p:cNvSpPr>
+          <p:nvPr>
+            <p:ph type="title"/>
+          </p:nvPr>
+        </p:nvSpPr>
+        <p:spPr/>
+        <p:txBody>
+          <a:bodyPr/>
+          <a:lstStyle/>
+          <a:p>
+            <a:r>
+              <a:rPr lang="en-US" dirty="0"/>
+              <a:t>Two ways to do one thing:</a:t>
+            </a:r>
+            <a:br>
+              <a:rPr lang="en-US" dirty="0"/>
+            </a:br>
+            <a:r>
+              <a:rPr lang="en-US" dirty="0"/>
+              <a:t>Static and Instance</a:t>
+            </a:r>
+          </a:p>
+        </p:txBody>
+      </p:sp>
+      <p:sp>
+        <p:nvSpPr>
+          <p:cNvPr id="3" name="Content Placeholder 2"/>
+          <p:cNvSpPr>
+            <a:spLocks noGrp="1"/>
+          </p:cNvSpPr>
+          <p:nvPr>
+            <p:ph idx="1"/>
+          </p:nvPr>
+        </p:nvSpPr>
+        <p:spPr/>
+        <p:txBody>
+          <a:bodyPr/>
+          <a:lstStyle/>
+          <a:p>
+            <a:r>
+              <a:rPr lang="en-US" dirty="0"/>
+              <a:t>Consider the Point class we used as a Quiz</a:t>
+            </a:r>
+          </a:p>
+          <a:p>
+            <a:r>
+              <a:rPr lang="en-US" dirty="0"/>
+              <a:t>Let’s write code to enable the </a:t>
+            </a:r>
+            <a:r>
+              <a:rPr lang="en-US" dirty="0" smtClean="0"/>
+              <a:t>following </a:t>
+            </a:r>
+            <a:r>
+              <a:rPr lang="en-US" dirty="0"/>
+              <a:t>to run</a:t>
+            </a:r>
+          </a:p>
+          <a:p>
+            <a:endParaRPr lang="en-US" dirty="0"/>
+          </a:p>
+          <a:p>
+            <a:pPr marL="0" indent="0">
+              <a:buNone/>
+            </a:pPr>
+            <a:r>
+              <a:rPr lang="en-US" dirty="0"/>
+              <a:t>Point a = new Point( 0</a:t>
+            </a:r>
+            <a:r>
+              <a:rPr lang="en-US" dirty="0" smtClean="0"/>
+              <a:t>, 0 </a:t>
+            </a:r>
+            <a:r>
+              <a:rPr lang="en-US" dirty="0"/>
+              <a:t>);</a:t>
+            </a:r>
+          </a:p>
+          <a:p>
+            <a:pPr marL="0" indent="0">
+              <a:buNone/>
+            </a:pPr>
+            <a:r>
+              <a:rPr lang="en-US" dirty="0"/>
+              <a:t>Point b = new Point( 3, 4);</a:t>
+            </a:r>
+          </a:p>
+          <a:p>
+            <a:pPr marL="0" indent="0">
+              <a:buNone/>
+            </a:pPr>
+            <a:r>
+              <a:rPr lang="en-US" dirty="0" err="1"/>
+              <a:t>System.out.println</a:t>
+            </a:r>
+            <a:r>
+              <a:rPr lang="en-US" dirty="0"/>
+              <a:t>(   </a:t>
+            </a:r>
+            <a:r>
+              <a:rPr lang="en-US" dirty="0" err="1"/>
+              <a:t>Point.distanceBetween</a:t>
+            </a:r>
+            <a:r>
+              <a:rPr lang="en-US" dirty="0"/>
+              <a:t>(</a:t>
+            </a:r>
+            <a:r>
+              <a:rPr lang="en-US" dirty="0" err="1"/>
+              <a:t>a,b</a:t>
+            </a:r>
+            <a:r>
+              <a:rPr lang="en-US" dirty="0"/>
+              <a:t>) );</a:t>
+            </a:r>
+          </a:p>
+          <a:p>
+            <a:pPr marL="0" indent="0">
+              <a:buNone/>
+            </a:pPr>
+            <a:r>
+              <a:rPr lang="en-US" dirty="0" err="1"/>
+              <a:t>System.out.println</a:t>
+            </a:r>
+            <a:r>
+              <a:rPr lang="en-US" dirty="0"/>
+              <a:t>(  </a:t>
+            </a:r>
+            <a:r>
+              <a:rPr lang="en-US" dirty="0" err="1"/>
+              <a:t>a.distanceTo</a:t>
+            </a:r>
+            <a:r>
+              <a:rPr lang="en-US" dirty="0"/>
+              <a:t>( b ) );</a:t>
+            </a:r>
+          </a:p>
+          <a:p>
+            <a:endParaRPr lang="en-US" dirty="0"/>
+          </a:p>
+        </p:txBody>
+      </p:sp>
+    </p:spTree>
+    <p:extLst>
+      <p:ext uri="{BB962C8B-B14F-4D97-AF65-F5344CB8AC3E}">
+        <p14:creationId xmlns:p14="http://schemas.microsoft.com/office/powerpoint/2010/main" val="377410102"/>
+      </p:ext>
+    </p:extLst>
+  </p:cSld>
+  <p:clrMapOvr>
+    <a:masterClrMapping/>
+  </p:clrMapOvr>
+</p:sld>
+</file>
+
+<file path=ppt/slides/slide18.xml><?xml version="1.0" encoding="utf-8"?>
+<p:sld xmlns:a="http://schemas.openxmlformats.org/drawingml/2006/main" xmlns:r="http://schemas.openxmlformats.org/officeDocument/2006/relationships" xmlns:p="http://schemas.openxmlformats.org/presentationml/2006/main">
+  <p:cSld>
+    <p:spTree>
+      <p:nvGrpSpPr>
+        <p:cNvPr id="1" name=""/>
+        <p:cNvGrpSpPr/>
+        <p:nvPr/>
+      </p:nvGrpSpPr>
+      <p:grpSpPr>
+        <a:xfrm>
+          <a:off x="0" y="0"/>
+          <a:ext cx="0" cy="0"/>
+          <a:chOff x="0" y="0"/>
+          <a:chExt cx="0" cy="0"/>
+        </a:xfrm>
+      </p:grpSpPr>
+      <p:sp>
+        <p:nvSpPr>
+          <p:cNvPr id="2" name="Title 1"/>
+          <p:cNvSpPr>
+            <a:spLocks noGrp="1"/>
+          </p:cNvSpPr>
+          <p:nvPr>
+            <p:ph type="title"/>
+          </p:nvPr>
+        </p:nvSpPr>
+        <p:spPr/>
+        <p:txBody>
+          <a:bodyPr/>
+          <a:lstStyle/>
+          <a:p>
+            <a:r>
+              <a:rPr lang="en-US" dirty="0"/>
+              <a:t>Live code</a:t>
+            </a:r>
+          </a:p>
+        </p:txBody>
+      </p:sp>
+      <p:sp>
+        <p:nvSpPr>
+          <p:cNvPr id="3" name="Content Placeholder 2"/>
+          <p:cNvSpPr>
+            <a:spLocks noGrp="1"/>
+          </p:cNvSpPr>
+          <p:nvPr>
+            <p:ph idx="1"/>
+          </p:nvPr>
+        </p:nvSpPr>
+        <p:spPr/>
+        <p:txBody>
+          <a:bodyPr/>
+          <a:lstStyle/>
+          <a:p>
+            <a:endParaRPr lang="en-US"/>
+          </a:p>
+        </p:txBody>
+      </p:sp>
+    </p:spTree>
+    <p:extLst>
+      <p:ext uri="{BB962C8B-B14F-4D97-AF65-F5344CB8AC3E}">
+        <p14:creationId xmlns:p14="http://schemas.microsoft.com/office/powerpoint/2010/main" val="614844681"/>
+      </p:ext>
+    </p:extLst>
+  </p:cSld>
+  <p:clrMapOvr>
+    <a:masterClrMapping/>
+  </p:clrMapOvr>
+</p:sld>
+</file>
+
+<file path=ppt/slides/slide19.xml><?xml version="1.0" encoding="utf-8"?>
 <p:sld xmlns:a="http://schemas.openxmlformats.org/drawingml/2006/main" xmlns:r="http://schemas.openxmlformats.org/officeDocument/2006/relationships" xmlns:p="http://schemas.openxmlformats.org/presentationml/2006/main">
   <p:cSld>
     <p:spTree>
@@ -13152,6 +13572,15 @@
                 <a:latin typeface="Lucida Sans Typewriter" pitchFamily="49" charset="0"/>
               </a:rPr>
               <a:t>y = 20;</a:t>
+            </a:r>
+            <a:r>
+              <a:rPr lang="en-US" sz="2400" dirty="0">
+                <a:solidFill>
+                  <a:schemeClr val="accent3"/>
+                </a:solidFill>
+                <a:latin typeface="Lucida Sans Typewriter" pitchFamily="49" charset="0"/>
+              </a:rPr>
+              <a:t/>
             </a:r>
             <a:br>
               <a:rPr lang="en-US" sz="2400" dirty="0">
@@ -19100,7 +19529,92 @@
           <a:bodyPr/>
           <a:lstStyle/>
           <a:p>
-            <a:endParaRPr lang="en-US"/>
+            <a:r>
+              <a:rPr lang="en-US" spc="-1" dirty="0">
+                <a:solidFill>
+                  <a:srgbClr val="000000"/>
+                </a:solidFill>
+                <a:uFill>
+                  <a:solidFill>
+                    <a:srgbClr val="FFFFFF"/>
+                  </a:solidFill>
+                </a:uFill>
+              </a:rPr>
+              <a:t>NO ARROWS FOR PRIMITIVES!</a:t>
+            </a:r>
+          </a:p>
+          <a:p>
+            <a:r>
+              <a:rPr lang="en-US" spc="-1" dirty="0">
+                <a:solidFill>
+                  <a:srgbClr val="000000"/>
+                </a:solidFill>
+                <a:uFill>
+                  <a:solidFill>
+                    <a:srgbClr val="FFFFFF"/>
+                  </a:solidFill>
+                </a:uFill>
+              </a:rPr>
+              <a:t>Key word new is a clue… draw a box</a:t>
+            </a:r>
+          </a:p>
+          <a:p>
+            <a:r>
+              <a:rPr lang="en-US" spc="-1" dirty="0">
+                <a:solidFill>
+                  <a:srgbClr val="000000"/>
+                </a:solidFill>
+                <a:uFill>
+                  <a:solidFill>
+                    <a:srgbClr val="FFFFFF"/>
+                  </a:solidFill>
+                </a:uFill>
+              </a:rPr>
+              <a:t>When you pass an Object into a method YOU PASS THE REFERENCE, so if you change it, it changes elsewhere!</a:t>
+            </a:r>
+          </a:p>
+          <a:p>
+            <a:r>
+              <a:rPr lang="en-US" spc="-1" dirty="0">
+                <a:solidFill>
+                  <a:srgbClr val="000000"/>
+                </a:solidFill>
+                <a:uFill>
+                  <a:solidFill>
+                    <a:srgbClr val="FFFFFF"/>
+                  </a:solidFill>
+                </a:uFill>
+                <a:sym typeface="Wingdings" panose="05000000000000000000" pitchFamily="2" charset="2"/>
+              </a:rPr>
+              <a:t>Notice arrow pointing to null,  null is not in a </a:t>
+            </a:r>
+            <a:r>
+              <a:rPr lang="en-US" spc="-1" dirty="0" smtClean="0">
+                <a:solidFill>
+                  <a:srgbClr val="000000"/>
+                </a:solidFill>
+                <a:uFill>
+                  <a:solidFill>
+                    <a:srgbClr val="FFFFFF"/>
+                  </a:solidFill>
+                </a:uFill>
+                <a:sym typeface="Wingdings" panose="05000000000000000000" pitchFamily="2" charset="2"/>
+              </a:rPr>
+              <a:t>box!</a:t>
+            </a:r>
+          </a:p>
+          <a:p>
+            <a:r>
+              <a:rPr lang="en-US" dirty="0" smtClean="0"/>
+              <a:t>SMALL </a:t>
+            </a:r>
+            <a:r>
+              <a:rPr lang="en-US" dirty="0"/>
+              <a:t>BOXES MUST NOT POINT TO OTHER  SMALL BOXES</a:t>
+            </a:r>
+          </a:p>
+          <a:p>
+            <a:endParaRPr lang="en-US" dirty="0"/>
           </a:p>
         </p:txBody>
       </p:sp>
@@ -19164,7 +19678,7 @@
     </p:spTree>
     <p:extLst>
       <p:ext uri="{BB962C8B-B14F-4D97-AF65-F5344CB8AC3E}">
-        <p14:creationId xmlns:p14="http://schemas.microsoft.com/office/powerpoint/2010/main" val="3295021768"/>
+        <p14:creationId xmlns:p14="http://schemas.microsoft.com/office/powerpoint/2010/main" val="792907088"/>
       </p:ext>
     </p:extLst>
   </p:cSld>

</xml_diff>